<commit_message>
there are only login
</commit_message>
<xml_diff>
--- a/UML.pptx
+++ b/UML.pptx
@@ -107,6 +107,11 @@
       </a:defRPr>
     </a:lvl9pPr>
   </p:defaultTextStyle>
+  <p:extLst>
+    <p:ext uri="{EFAFB233-063F-42B5-8137-9DF3F51BA10A}">
+      <p15:sldGuideLst xmlns:p15="http://schemas.microsoft.com/office/powerpoint/2012/main"/>
+    </p:ext>
+  </p:extLst>
 </p:presentation>
 </file>
 
@@ -3771,7 +3776,7 @@
         </p:nvSpPr>
         <p:spPr>
           <a:xfrm>
-            <a:off x="5853723" y="1201405"/>
+            <a:off x="5862867" y="1204355"/>
             <a:ext cx="651140" cy="369332"/>
           </a:xfrm>
           <a:prstGeom prst="rect">
@@ -3808,7 +3813,7 @@
         <p:spPr>
           <a:xfrm>
             <a:off x="5188037" y="1501938"/>
-            <a:ext cx="1362874" cy="830997"/>
+            <a:ext cx="1162947" cy="830997"/>
           </a:xfrm>
           <a:prstGeom prst="rect">
             <a:avLst/>
@@ -3845,11 +3850,11 @@
             </a:r>
             <a:r>
               <a:rPr kumimoji="1" lang="en-US" altLang="ko-KR" sz="1200" dirty="0" err="1"/>
-              <a:t>usertype</a:t>
+              <a:t>userType</a:t>
             </a:r>
             <a:r>
               <a:rPr kumimoji="1" lang="en-US" altLang="ko-KR" sz="1200" dirty="0"/>
-              <a:t>: string</a:t>
+              <a:t>: int</a:t>
             </a:r>
           </a:p>
         </p:txBody>
@@ -4351,7 +4356,7 @@
         <p:spPr>
           <a:xfrm>
             <a:off x="5228264" y="3950448"/>
-            <a:ext cx="1362874" cy="830997"/>
+            <a:ext cx="1162947" cy="830997"/>
           </a:xfrm>
           <a:prstGeom prst="rect">
             <a:avLst/>
@@ -4388,11 +4393,11 @@
             </a:r>
             <a:r>
               <a:rPr kumimoji="1" lang="en-US" altLang="ko-KR" sz="1200" dirty="0" err="1"/>
-              <a:t>usertype</a:t>
+              <a:t>userType</a:t>
             </a:r>
             <a:r>
               <a:rPr kumimoji="1" lang="en-US" altLang="ko-KR" sz="1200" dirty="0"/>
-              <a:t>: string</a:t>
+              <a:t>: int</a:t>
             </a:r>
           </a:p>
         </p:txBody>
@@ -4716,7 +4721,7 @@
         <p:spPr>
           <a:xfrm>
             <a:off x="8111822" y="3967448"/>
-            <a:ext cx="1362874" cy="830997"/>
+            <a:ext cx="1162947" cy="830997"/>
           </a:xfrm>
           <a:prstGeom prst="rect">
             <a:avLst/>
@@ -4753,11 +4758,11 @@
             </a:r>
             <a:r>
               <a:rPr kumimoji="1" lang="en-US" altLang="ko-KR" sz="1200" dirty="0" err="1"/>
-              <a:t>usertype</a:t>
+              <a:t>userType</a:t>
             </a:r>
             <a:r>
               <a:rPr kumimoji="1" lang="en-US" altLang="ko-KR" sz="1200" dirty="0"/>
-              <a:t>: string</a:t>
+              <a:t>: int</a:t>
             </a:r>
           </a:p>
         </p:txBody>
@@ -5080,7 +5085,7 @@
         <p:spPr>
           <a:xfrm>
             <a:off x="2171283" y="3967448"/>
-            <a:ext cx="1362874" cy="830997"/>
+            <a:ext cx="1162947" cy="830997"/>
           </a:xfrm>
           <a:prstGeom prst="rect">
             <a:avLst/>
@@ -5117,11 +5122,11 @@
             </a:r>
             <a:r>
               <a:rPr kumimoji="1" lang="en-US" altLang="ko-KR" sz="1200" dirty="0" err="1"/>
-              <a:t>usertype</a:t>
+              <a:t>userType</a:t>
             </a:r>
             <a:r>
               <a:rPr kumimoji="1" lang="en-US" altLang="ko-KR" sz="1200" dirty="0"/>
-              <a:t>: string</a:t>
+              <a:t>: int</a:t>
             </a:r>
           </a:p>
         </p:txBody>

</xml_diff>